<commit_message>
praesi und demo dateien
</commit_message>
<xml_diff>
--- a/doc/Stegano-Praesentation.pptx
+++ b/doc/Stegano-Praesentation.pptx
@@ -5,7 +5,7 @@
     <p:sldMasterId id="2147483648" r:id="rId1"/>
   </p:sldMasterIdLst>
   <p:notesMasterIdLst>
-    <p:notesMasterId r:id="rId9"/>
+    <p:notesMasterId r:id="rId10"/>
   </p:notesMasterIdLst>
   <p:sldIdLst>
     <p:sldId id="256" r:id="rId2"/>
@@ -14,7 +14,8 @@
     <p:sldId id="260" r:id="rId5"/>
     <p:sldId id="259" r:id="rId6"/>
     <p:sldId id="261" r:id="rId7"/>
-    <p:sldId id="262" r:id="rId8"/>
+    <p:sldId id="263" r:id="rId8"/>
+    <p:sldId id="262" r:id="rId9"/>
   </p:sldIdLst>
   <p:sldSz cx="9144000" cy="6858000" type="screen4x3"/>
   <p:notesSz cx="6858000" cy="9144000"/>
@@ -198,7 +199,7 @@
           <a:p>
             <a:fld id="{25A516CA-FEEA-4891-B841-346B6102FD16}" type="datetimeFigureOut">
               <a:rPr lang="de-CH" smtClean="0"/>
-              <a:t>15.06.2012</a:t>
+              <a:t>16.06.2012</a:t>
             </a:fld>
             <a:endParaRPr lang="de-CH"/>
           </a:p>
@@ -843,6 +844,116 @@
           <a:bodyPr/>
           <a:lstStyle/>
           <a:p>
+            <a:r>
+              <a:rPr lang="de-CH" dirty="0" smtClean="0"/>
+              <a:t>Bild- und Audiodateien haben sich angeboten, da deren</a:t>
+            </a:r>
+            <a:r>
+              <a:rPr lang="de-CH" baseline="0" dirty="0" smtClean="0"/>
+              <a:t> Darstellung über menschliche Organe Aufgenommen werden welche nicht genau sind.</a:t>
+            </a:r>
+          </a:p>
+          <a:p>
+            <a:endParaRPr lang="de-CH" baseline="0" dirty="0" smtClean="0"/>
+          </a:p>
+          <a:p>
+            <a:r>
+              <a:rPr lang="de-CH" baseline="0" dirty="0" smtClean="0"/>
+              <a:t>Es können beliebige (digitale) Informationen versteckt werden.</a:t>
+            </a:r>
+          </a:p>
+          <a:p>
+            <a:endParaRPr lang="de-CH" baseline="0" dirty="0" smtClean="0"/>
+          </a:p>
+          <a:p>
+            <a:r>
+              <a:rPr lang="de-CH" baseline="0" dirty="0" smtClean="0"/>
+              <a:t>Nur bei verlustfreien Dateiformaten können die Daten wieder komplett rekonstruiert werden. Verlustbehaftete Dateitypen eliminieren oft die Informationen, welche Menschen nicht wahrnehmen können. Dort wiederum ist natürlich potenziell Platz um Daten zu verstecken.</a:t>
+            </a:r>
+            <a:endParaRPr lang="de-CH" dirty="0"/>
+          </a:p>
+        </p:txBody>
+      </p:sp>
+      <p:sp>
+        <p:nvSpPr>
+          <p:cNvPr id="4" name="Foliennummernplatzhalter 3"/>
+          <p:cNvSpPr>
+            <a:spLocks noGrp="1"/>
+          </p:cNvSpPr>
+          <p:nvPr>
+            <p:ph type="sldNum" sz="quarter" idx="10"/>
+          </p:nvPr>
+        </p:nvSpPr>
+        <p:spPr/>
+        <p:txBody>
+          <a:bodyPr/>
+          <a:lstStyle/>
+          <a:p>
+            <a:fld id="{ED7E74AB-89F2-4CA8-B1E2-4EFAA6854E58}" type="slidenum">
+              <a:rPr lang="de-CH" smtClean="0"/>
+              <a:t>4</a:t>
+            </a:fld>
+            <a:endParaRPr lang="de-CH"/>
+          </a:p>
+        </p:txBody>
+      </p:sp>
+    </p:spTree>
+    <p:extLst>
+      <p:ext uri="{BB962C8B-B14F-4D97-AF65-F5344CB8AC3E}">
+        <p14:creationId xmlns:p14="http://schemas.microsoft.com/office/powerpoint/2010/main" val="1832297459"/>
+      </p:ext>
+    </p:extLst>
+  </p:cSld>
+  <p:clrMapOvr>
+    <a:masterClrMapping/>
+  </p:clrMapOvr>
+</p:notes>
+</file>
+
+<file path=ppt/notesSlides/notesSlide3.xml><?xml version="1.0" encoding="utf-8"?>
+<p:notes xmlns:a="http://schemas.openxmlformats.org/drawingml/2006/main" xmlns:r="http://schemas.openxmlformats.org/officeDocument/2006/relationships" xmlns:p="http://schemas.openxmlformats.org/presentationml/2006/main">
+  <p:cSld>
+    <p:spTree>
+      <p:nvGrpSpPr>
+        <p:cNvPr id="1" name=""/>
+        <p:cNvGrpSpPr/>
+        <p:nvPr/>
+      </p:nvGrpSpPr>
+      <p:grpSpPr>
+        <a:xfrm>
+          <a:off x="0" y="0"/>
+          <a:ext cx="0" cy="0"/>
+          <a:chOff x="0" y="0"/>
+          <a:chExt cx="0" cy="0"/>
+        </a:xfrm>
+      </p:grpSpPr>
+      <p:sp>
+        <p:nvSpPr>
+          <p:cNvPr id="2" name="Folienbildplatzhalter 1"/>
+          <p:cNvSpPr>
+            <a:spLocks noGrp="1" noRot="1" noChangeAspect="1"/>
+          </p:cNvSpPr>
+          <p:nvPr>
+            <p:ph type="sldImg"/>
+          </p:nvPr>
+        </p:nvSpPr>
+        <p:spPr/>
+      </p:sp>
+      <p:sp>
+        <p:nvSpPr>
+          <p:cNvPr id="3" name="Notizenplatzhalter 2"/>
+          <p:cNvSpPr>
+            <a:spLocks noGrp="1"/>
+          </p:cNvSpPr>
+          <p:nvPr>
+            <p:ph type="body" idx="1"/>
+          </p:nvPr>
+        </p:nvSpPr>
+        <p:spPr/>
+        <p:txBody>
+          <a:bodyPr/>
+          <a:lstStyle/>
+          <a:p>
             <a:endParaRPr lang="de-CH" dirty="0"/>
           </a:p>
         </p:txBody>
@@ -874,6 +985,191 @@
     <p:extLst>
       <p:ext uri="{BB962C8B-B14F-4D97-AF65-F5344CB8AC3E}">
         <p14:creationId xmlns:p14="http://schemas.microsoft.com/office/powerpoint/2010/main" val="338859414"/>
+      </p:ext>
+    </p:extLst>
+  </p:cSld>
+  <p:clrMapOvr>
+    <a:masterClrMapping/>
+  </p:clrMapOvr>
+</p:notes>
+</file>
+
+<file path=ppt/notesSlides/notesSlide4.xml><?xml version="1.0" encoding="utf-8"?>
+<p:notes xmlns:a="http://schemas.openxmlformats.org/drawingml/2006/main" xmlns:r="http://schemas.openxmlformats.org/officeDocument/2006/relationships" xmlns:p="http://schemas.openxmlformats.org/presentationml/2006/main">
+  <p:cSld>
+    <p:spTree>
+      <p:nvGrpSpPr>
+        <p:cNvPr id="1" name=""/>
+        <p:cNvGrpSpPr/>
+        <p:nvPr/>
+      </p:nvGrpSpPr>
+      <p:grpSpPr>
+        <a:xfrm>
+          <a:off x="0" y="0"/>
+          <a:ext cx="0" cy="0"/>
+          <a:chOff x="0" y="0"/>
+          <a:chExt cx="0" cy="0"/>
+        </a:xfrm>
+      </p:grpSpPr>
+      <p:sp>
+        <p:nvSpPr>
+          <p:cNvPr id="2" name="Folienbildplatzhalter 1"/>
+          <p:cNvSpPr>
+            <a:spLocks noGrp="1" noRot="1" noChangeAspect="1"/>
+          </p:cNvSpPr>
+          <p:nvPr>
+            <p:ph type="sldImg"/>
+          </p:nvPr>
+        </p:nvSpPr>
+        <p:spPr/>
+      </p:sp>
+      <p:sp>
+        <p:nvSpPr>
+          <p:cNvPr id="3" name="Notizenplatzhalter 2"/>
+          <p:cNvSpPr>
+            <a:spLocks noGrp="1"/>
+          </p:cNvSpPr>
+          <p:nvPr>
+            <p:ph type="body" idx="1"/>
+          </p:nvPr>
+        </p:nvSpPr>
+        <p:spPr/>
+        <p:txBody>
+          <a:bodyPr/>
+          <a:lstStyle/>
+          <a:p>
+            <a:r>
+              <a:rPr lang="de-CH" dirty="0" smtClean="0"/>
+              <a:t>BMP</a:t>
+            </a:r>
+            <a:r>
+              <a:rPr lang="de-CH" baseline="0" dirty="0" smtClean="0"/>
+              <a:t> ist stark standardisiert, üblich sind 3 Bytes für die Codierung der Farbe (24Bit). Dies bedeutet, dass jeder Farbe 256 Stufen zur Verfügung stehen. Falls das LSB bei jeder Farbe geändert wird entspricht das einer kaum wahrnehmbaren Veränderung von 0.000048 %</a:t>
+            </a:r>
+          </a:p>
+          <a:p>
+            <a:endParaRPr lang="de-CH" baseline="0" dirty="0" smtClean="0"/>
+          </a:p>
+          <a:p>
+            <a:r>
+              <a:rPr lang="de-CH" baseline="0" dirty="0" smtClean="0"/>
+              <a:t>WAV ist auch Standardisiert, lässt aber viel Spielraum (welcher auch genutzt wird). So gibt es verschiedene Formate von Microsoft und von Apple (WAV und AIFF, war nicht anders zu erwarten). Variieren kann die Headerlänge, Datenformat, Kanäle, Samplerate, Framegrösse, Bits pro Sample sowie je nach Unterversion weitere Eigenschaften.</a:t>
+            </a:r>
+            <a:endParaRPr lang="de-CH" dirty="0"/>
+          </a:p>
+        </p:txBody>
+      </p:sp>
+      <p:sp>
+        <p:nvSpPr>
+          <p:cNvPr id="4" name="Foliennummernplatzhalter 3"/>
+          <p:cNvSpPr>
+            <a:spLocks noGrp="1"/>
+          </p:cNvSpPr>
+          <p:nvPr>
+            <p:ph type="sldNum" sz="quarter" idx="10"/>
+          </p:nvPr>
+        </p:nvSpPr>
+        <p:spPr/>
+        <p:txBody>
+          <a:bodyPr/>
+          <a:lstStyle/>
+          <a:p>
+            <a:fld id="{ED7E74AB-89F2-4CA8-B1E2-4EFAA6854E58}" type="slidenum">
+              <a:rPr lang="de-CH" smtClean="0"/>
+              <a:t>6</a:t>
+            </a:fld>
+            <a:endParaRPr lang="de-CH"/>
+          </a:p>
+        </p:txBody>
+      </p:sp>
+    </p:spTree>
+    <p:extLst>
+      <p:ext uri="{BB962C8B-B14F-4D97-AF65-F5344CB8AC3E}">
+        <p14:creationId xmlns:p14="http://schemas.microsoft.com/office/powerpoint/2010/main" val="2207454575"/>
+      </p:ext>
+    </p:extLst>
+  </p:cSld>
+  <p:clrMapOvr>
+    <a:masterClrMapping/>
+  </p:clrMapOvr>
+</p:notes>
+</file>
+
+<file path=ppt/notesSlides/notesSlide5.xml><?xml version="1.0" encoding="utf-8"?>
+<p:notes xmlns:a="http://schemas.openxmlformats.org/drawingml/2006/main" xmlns:r="http://schemas.openxmlformats.org/officeDocument/2006/relationships" xmlns:p="http://schemas.openxmlformats.org/presentationml/2006/main">
+  <p:cSld>
+    <p:spTree>
+      <p:nvGrpSpPr>
+        <p:cNvPr id="1" name=""/>
+        <p:cNvGrpSpPr/>
+        <p:nvPr/>
+      </p:nvGrpSpPr>
+      <p:grpSpPr>
+        <a:xfrm>
+          <a:off x="0" y="0"/>
+          <a:ext cx="0" cy="0"/>
+          <a:chOff x="0" y="0"/>
+          <a:chExt cx="0" cy="0"/>
+        </a:xfrm>
+      </p:grpSpPr>
+      <p:sp>
+        <p:nvSpPr>
+          <p:cNvPr id="2" name="Folienbildplatzhalter 1"/>
+          <p:cNvSpPr>
+            <a:spLocks noGrp="1" noRot="1" noChangeAspect="1"/>
+          </p:cNvSpPr>
+          <p:nvPr>
+            <p:ph type="sldImg"/>
+          </p:nvPr>
+        </p:nvSpPr>
+        <p:spPr/>
+      </p:sp>
+      <p:sp>
+        <p:nvSpPr>
+          <p:cNvPr id="3" name="Notizenplatzhalter 2"/>
+          <p:cNvSpPr>
+            <a:spLocks noGrp="1"/>
+          </p:cNvSpPr>
+          <p:nvPr>
+            <p:ph type="body" idx="1"/>
+          </p:nvPr>
+        </p:nvSpPr>
+        <p:spPr/>
+        <p:txBody>
+          <a:bodyPr/>
+          <a:lstStyle/>
+          <a:p>
+            <a:endParaRPr lang="de-CH"/>
+          </a:p>
+        </p:txBody>
+      </p:sp>
+      <p:sp>
+        <p:nvSpPr>
+          <p:cNvPr id="4" name="Foliennummernplatzhalter 3"/>
+          <p:cNvSpPr>
+            <a:spLocks noGrp="1"/>
+          </p:cNvSpPr>
+          <p:nvPr>
+            <p:ph type="sldNum" sz="quarter" idx="10"/>
+          </p:nvPr>
+        </p:nvSpPr>
+        <p:spPr/>
+        <p:txBody>
+          <a:bodyPr/>
+          <a:lstStyle/>
+          <a:p>
+            <a:fld id="{ED7E74AB-89F2-4CA8-B1E2-4EFAA6854E58}" type="slidenum">
+              <a:rPr lang="de-CH" smtClean="0"/>
+              <a:t>7</a:t>
+            </a:fld>
+            <a:endParaRPr lang="de-CH"/>
+          </a:p>
+        </p:txBody>
+      </p:sp>
+    </p:spTree>
+    <p:extLst>
+      <p:ext uri="{BB962C8B-B14F-4D97-AF65-F5344CB8AC3E}">
+        <p14:creationId xmlns:p14="http://schemas.microsoft.com/office/powerpoint/2010/main" val="186744079"/>
       </p:ext>
     </p:extLst>
   </p:cSld>
@@ -1064,7 +1360,7 @@
           <a:p>
             <a:fld id="{1BA50D42-C9CD-4801-B293-61D1F53EC57E}" type="datetimeFigureOut">
               <a:rPr lang="de-DE" smtClean="0"/>
-              <a:t>15.06.2012</a:t>
+              <a:t>16.06.2012</a:t>
             </a:fld>
             <a:endParaRPr lang="de-DE"/>
           </a:p>
@@ -1229,7 +1525,7 @@
           <a:p>
             <a:fld id="{1BA50D42-C9CD-4801-B293-61D1F53EC57E}" type="datetimeFigureOut">
               <a:rPr lang="de-DE" smtClean="0"/>
-              <a:t>15.06.2012</a:t>
+              <a:t>16.06.2012</a:t>
             </a:fld>
             <a:endParaRPr lang="de-DE"/>
           </a:p>
@@ -1404,7 +1700,7 @@
           <a:p>
             <a:fld id="{1BA50D42-C9CD-4801-B293-61D1F53EC57E}" type="datetimeFigureOut">
               <a:rPr lang="de-DE" smtClean="0"/>
-              <a:t>15.06.2012</a:t>
+              <a:t>16.06.2012</a:t>
             </a:fld>
             <a:endParaRPr lang="de-DE"/>
           </a:p>
@@ -1569,7 +1865,7 @@
           <a:p>
             <a:fld id="{1BA50D42-C9CD-4801-B293-61D1F53EC57E}" type="datetimeFigureOut">
               <a:rPr lang="de-DE" smtClean="0"/>
-              <a:t>15.06.2012</a:t>
+              <a:t>16.06.2012</a:t>
             </a:fld>
             <a:endParaRPr lang="de-DE"/>
           </a:p>
@@ -1810,7 +2106,7 @@
           <a:p>
             <a:fld id="{1BA50D42-C9CD-4801-B293-61D1F53EC57E}" type="datetimeFigureOut">
               <a:rPr lang="de-DE" smtClean="0"/>
-              <a:t>15.06.2012</a:t>
+              <a:t>16.06.2012</a:t>
             </a:fld>
             <a:endParaRPr lang="de-DE"/>
           </a:p>
@@ -2093,7 +2389,7 @@
           <a:p>
             <a:fld id="{1BA50D42-C9CD-4801-B293-61D1F53EC57E}" type="datetimeFigureOut">
               <a:rPr lang="de-DE" smtClean="0"/>
-              <a:t>15.06.2012</a:t>
+              <a:t>16.06.2012</a:t>
             </a:fld>
             <a:endParaRPr lang="de-DE"/>
           </a:p>
@@ -2510,7 +2806,7 @@
           <a:p>
             <a:fld id="{1BA50D42-C9CD-4801-B293-61D1F53EC57E}" type="datetimeFigureOut">
               <a:rPr lang="de-DE" smtClean="0"/>
-              <a:t>15.06.2012</a:t>
+              <a:t>16.06.2012</a:t>
             </a:fld>
             <a:endParaRPr lang="de-DE"/>
           </a:p>
@@ -2623,7 +2919,7 @@
           <a:p>
             <a:fld id="{1BA50D42-C9CD-4801-B293-61D1F53EC57E}" type="datetimeFigureOut">
               <a:rPr lang="de-DE" smtClean="0"/>
-              <a:t>15.06.2012</a:t>
+              <a:t>16.06.2012</a:t>
             </a:fld>
             <a:endParaRPr lang="de-DE"/>
           </a:p>
@@ -2713,7 +3009,7 @@
           <a:p>
             <a:fld id="{1BA50D42-C9CD-4801-B293-61D1F53EC57E}" type="datetimeFigureOut">
               <a:rPr lang="de-DE" smtClean="0"/>
-              <a:t>15.06.2012</a:t>
+              <a:t>16.06.2012</a:t>
             </a:fld>
             <a:endParaRPr lang="de-DE"/>
           </a:p>
@@ -2985,7 +3281,7 @@
           <a:p>
             <a:fld id="{1BA50D42-C9CD-4801-B293-61D1F53EC57E}" type="datetimeFigureOut">
               <a:rPr lang="de-DE" smtClean="0"/>
-              <a:t>15.06.2012</a:t>
+              <a:t>16.06.2012</a:t>
             </a:fld>
             <a:endParaRPr lang="de-DE"/>
           </a:p>
@@ -3233,7 +3529,7 @@
           <a:p>
             <a:fld id="{1BA50D42-C9CD-4801-B293-61D1F53EC57E}" type="datetimeFigureOut">
               <a:rPr lang="de-DE" smtClean="0"/>
-              <a:t>15.06.2012</a:t>
+              <a:t>16.06.2012</a:t>
             </a:fld>
             <a:endParaRPr lang="de-DE"/>
           </a:p>
@@ -3441,7 +3737,7 @@
           <a:p>
             <a:fld id="{1BA50D42-C9CD-4801-B293-61D1F53EC57E}" type="datetimeFigureOut">
               <a:rPr lang="de-DE" smtClean="0"/>
-              <a:t>15.06.2012</a:t>
+              <a:t>16.06.2012</a:t>
             </a:fld>
             <a:endParaRPr lang="de-DE"/>
           </a:p>
@@ -4020,7 +4316,6 @@
               <a:rPr lang="de-CH" dirty="0" smtClean="0"/>
               <a:t>Anforderungen an die Applikation</a:t>
             </a:r>
-            <a:endParaRPr lang="de-CH" dirty="0" smtClean="0"/>
           </a:p>
           <a:p>
             <a:r>
@@ -4355,17 +4650,80 @@
             </a:r>
             <a:r>
               <a:rPr lang="de-CH" dirty="0" smtClean="0"/>
-              <a:t> aufbauen</a:t>
-            </a:r>
-          </a:p>
-          <a:p>
+              <a:t> </a:t>
+            </a:r>
             <a:r>
               <a:rPr lang="de-CH" dirty="0" smtClean="0"/>
-              <a:t> HEADER BILD</a:t>
-            </a:r>
-          </a:p>
-        </p:txBody>
-      </p:sp>
+              <a:t>aufbauen</a:t>
+            </a:r>
+            <a:endParaRPr lang="de-CH" dirty="0" smtClean="0"/>
+          </a:p>
+        </p:txBody>
+      </p:sp>
+      <p:pic>
+        <p:nvPicPr>
+          <p:cNvPr id="1026" name="Picture 2"/>
+          <p:cNvPicPr>
+            <a:picLocks noChangeAspect="1" noChangeArrowheads="1"/>
+          </p:cNvPicPr>
+          <p:nvPr/>
+        </p:nvPicPr>
+        <p:blipFill>
+          <a:blip r:embed="rId3">
+            <a:extLst>
+              <a:ext uri="{28A0092B-C50C-407E-A947-70E740481C1C}">
+                <a14:useLocalDpi xmlns:a14="http://schemas.microsoft.com/office/drawing/2010/main" val="0"/>
+              </a:ext>
+            </a:extLst>
+          </a:blip>
+          <a:srcRect/>
+          <a:stretch>
+            <a:fillRect/>
+          </a:stretch>
+        </p:blipFill>
+        <p:spPr bwMode="auto">
+          <a:xfrm>
+            <a:off x="297799" y="2996952"/>
+            <a:ext cx="8591550" cy="2146300"/>
+          </a:xfrm>
+          <a:prstGeom prst="rect">
+            <a:avLst/>
+          </a:prstGeom>
+          <a:noFill/>
+          <a:ln>
+            <a:noFill/>
+          </a:ln>
+          <a:effectLst/>
+          <a:extLst>
+            <a:ext uri="{909E8E84-426E-40DD-AFC4-6F175D3DCCD1}">
+              <a14:hiddenFill xmlns:a14="http://schemas.microsoft.com/office/drawing/2010/main">
+                <a:solidFill>
+                  <a:schemeClr val="accent1"/>
+                </a:solidFill>
+              </a14:hiddenFill>
+            </a:ext>
+            <a:ext uri="{91240B29-F687-4F45-9708-019B960494DF}">
+              <a14:hiddenLine xmlns:a14="http://schemas.microsoft.com/office/drawing/2010/main" w="9525">
+                <a:solidFill>
+                  <a:schemeClr val="tx1"/>
+                </a:solidFill>
+                <a:miter lim="800000"/>
+                <a:headEnd/>
+                <a:tailEnd/>
+              </a14:hiddenLine>
+            </a:ext>
+            <a:ext uri="{AF507438-7753-43E0-B8FC-AC1667EBCBE1}">
+              <a14:hiddenEffects xmlns:a14="http://schemas.microsoft.com/office/drawing/2010/main">
+                <a:effectLst>
+                  <a:outerShdw dist="35921" dir="2700000" algn="ctr" rotWithShape="0">
+                    <a:schemeClr val="bg2"/>
+                  </a:outerShdw>
+                </a:effectLst>
+              </a14:hiddenEffects>
+            </a:ext>
+          </a:extLst>
+        </p:spPr>
+      </p:pic>
     </p:spTree>
     <p:extLst>
       <p:ext uri="{BB962C8B-B14F-4D97-AF65-F5344CB8AC3E}">
@@ -4479,7 +4837,14 @@
             <a:pPr lvl="2"/>
             <a:r>
               <a:rPr lang="de-CH" dirty="0" smtClean="0"/>
-              <a:t>Bei WAV-Dateien  ???</a:t>
+              <a:t>Von Datei zu Datei sehr unterschiedlich, mehrere Kanäle und verschiedene Bittiefe (Auflösung)</a:t>
+            </a:r>
+          </a:p>
+          <a:p>
+            <a:pPr lvl="2"/>
+            <a:r>
+              <a:rPr lang="de-CH" dirty="0" smtClean="0"/>
+              <a:t>Samplerate kann beim Verstecken vernachlässigt werden</a:t>
             </a:r>
             <a:endParaRPr lang="de-CH" dirty="0"/>
           </a:p>
@@ -4506,6 +4871,134 @@
 </file>
 
 <file path=ppt/slides/slide7.xml><?xml version="1.0" encoding="utf-8"?>
+<p:sld xmlns:a="http://schemas.openxmlformats.org/drawingml/2006/main" xmlns:r="http://schemas.openxmlformats.org/officeDocument/2006/relationships" xmlns:p="http://schemas.openxmlformats.org/presentationml/2006/main">
+  <p:cSld>
+    <p:spTree>
+      <p:nvGrpSpPr>
+        <p:cNvPr id="1" name=""/>
+        <p:cNvGrpSpPr/>
+        <p:nvPr/>
+      </p:nvGrpSpPr>
+      <p:grpSpPr>
+        <a:xfrm>
+          <a:off x="0" y="0"/>
+          <a:ext cx="0" cy="0"/>
+          <a:chOff x="0" y="0"/>
+          <a:chExt cx="0" cy="0"/>
+        </a:xfrm>
+      </p:grpSpPr>
+      <p:sp>
+        <p:nvSpPr>
+          <p:cNvPr id="2" name="Titel 1"/>
+          <p:cNvSpPr>
+            <a:spLocks noGrp="1"/>
+          </p:cNvSpPr>
+          <p:nvPr>
+            <p:ph type="title"/>
+          </p:nvPr>
+        </p:nvSpPr>
+        <p:spPr/>
+        <p:txBody>
+          <a:bodyPr/>
+          <a:lstStyle/>
+          <a:p>
+            <a:r>
+              <a:rPr lang="de-CH" dirty="0" smtClean="0"/>
+              <a:t>Probleme</a:t>
+            </a:r>
+            <a:endParaRPr lang="de-CH" dirty="0"/>
+          </a:p>
+        </p:txBody>
+      </p:sp>
+      <p:sp>
+        <p:nvSpPr>
+          <p:cNvPr id="3" name="Inhaltsplatzhalter 2"/>
+          <p:cNvSpPr>
+            <a:spLocks noGrp="1"/>
+          </p:cNvSpPr>
+          <p:nvPr>
+            <p:ph idx="1"/>
+          </p:nvPr>
+        </p:nvSpPr>
+        <p:spPr/>
+        <p:txBody>
+          <a:bodyPr/>
+          <a:lstStyle/>
+          <a:p>
+            <a:r>
+              <a:rPr lang="de-CH" dirty="0" smtClean="0"/>
+              <a:t>Audio-Implementation</a:t>
+            </a:r>
+          </a:p>
+          <a:p>
+            <a:pPr lvl="1"/>
+            <a:r>
+              <a:rPr lang="de-CH" dirty="0" smtClean="0"/>
+              <a:t>Aufwändiger als erwartet, Zeit falsch geschätzt</a:t>
+            </a:r>
+          </a:p>
+          <a:p>
+            <a:pPr lvl="1"/>
+            <a:r>
+              <a:rPr lang="de-CH" dirty="0" smtClean="0"/>
+              <a:t>Nur eine gute </a:t>
+            </a:r>
+            <a:r>
+              <a:rPr lang="de-CH" dirty="0" err="1" smtClean="0"/>
+              <a:t>Referenzimplementation</a:t>
+            </a:r>
+            <a:r>
+              <a:rPr lang="de-CH" dirty="0" smtClean="0"/>
+              <a:t> gefunden, auch mit groben Fehlern</a:t>
+            </a:r>
+          </a:p>
+          <a:p>
+            <a:r>
+              <a:rPr lang="de-CH" dirty="0" smtClean="0"/>
+              <a:t>Pollution-Settings (optional)</a:t>
+            </a:r>
+          </a:p>
+          <a:p>
+            <a:pPr lvl="1"/>
+            <a:r>
+              <a:rPr lang="de-CH" dirty="0" smtClean="0"/>
+              <a:t>Im Code schon vorgesehen</a:t>
+            </a:r>
+          </a:p>
+          <a:p>
+            <a:pPr lvl="1"/>
+            <a:r>
+              <a:rPr lang="de-CH" dirty="0" smtClean="0"/>
+              <a:t>Aufgrund Fokus auf Audio-Implementation nicht umgesetzt</a:t>
+            </a:r>
+          </a:p>
+          <a:p>
+            <a:pPr lvl="1"/>
+            <a:endParaRPr lang="de-CH" dirty="0"/>
+          </a:p>
+        </p:txBody>
+      </p:sp>
+    </p:spTree>
+    <p:extLst>
+      <p:ext uri="{BB962C8B-B14F-4D97-AF65-F5344CB8AC3E}">
+        <p14:creationId xmlns:p14="http://schemas.microsoft.com/office/powerpoint/2010/main" val="2121771388"/>
+      </p:ext>
+    </p:extLst>
+  </p:cSld>
+  <p:clrMapOvr>
+    <a:masterClrMapping/>
+  </p:clrMapOvr>
+  <p:timing>
+    <p:tnLst>
+      <p:par>
+        <p:cTn id="1" dur="indefinite" restart="never" nodeType="tmRoot"/>
+      </p:par>
+    </p:tnLst>
+  </p:timing>
+</p:sld>
+</file>
+
+<file path=ppt/slides/slide8.xml><?xml version="1.0" encoding="utf-8"?>
 <p:sld xmlns:a="http://schemas.openxmlformats.org/drawingml/2006/main" xmlns:r="http://schemas.openxmlformats.org/officeDocument/2006/relationships" xmlns:p="http://schemas.openxmlformats.org/presentationml/2006/main">
   <p:cSld>
     <p:spTree>

</xml_diff>